<commit_message>
docment and logo on tab
</commit_message>
<xml_diff>
--- a/Progress Project Presentation/BBS_SAD_GroupProject.pptx
+++ b/Progress Project Presentation/BBS_SAD_GroupProject.pptx
@@ -5,7 +5,7 @@
     <p:sldMasterId id="2147483648" r:id="rId1"/>
   </p:sldMasterIdLst>
   <p:notesMasterIdLst>
-    <p:notesMasterId r:id="rId19"/>
+    <p:notesMasterId r:id="rId20"/>
   </p:notesMasterIdLst>
   <p:sldIdLst>
     <p:sldId id="256" r:id="rId2"/>
@@ -19,45 +19,46 @@
     <p:sldId id="295" r:id="rId10"/>
     <p:sldId id="271" r:id="rId11"/>
     <p:sldId id="272" r:id="rId12"/>
-    <p:sldId id="297" r:id="rId13"/>
-    <p:sldId id="299" r:id="rId14"/>
-    <p:sldId id="290" r:id="rId15"/>
-    <p:sldId id="298" r:id="rId16"/>
-    <p:sldId id="265" r:id="rId17"/>
-    <p:sldId id="266" r:id="rId18"/>
+    <p:sldId id="300" r:id="rId13"/>
+    <p:sldId id="297" r:id="rId14"/>
+    <p:sldId id="299" r:id="rId15"/>
+    <p:sldId id="290" r:id="rId16"/>
+    <p:sldId id="298" r:id="rId17"/>
+    <p:sldId id="265" r:id="rId18"/>
+    <p:sldId id="266" r:id="rId19"/>
   </p:sldIdLst>
   <p:sldSz cx="12192000" cy="6858000"/>
   <p:notesSz cx="6858000" cy="9144000"/>
   <p:embeddedFontLst>
     <p:embeddedFont>
       <p:font typeface="Agency FB" panose="020B0503020202020204" pitchFamily="34" charset="0"/>
-      <p:regular r:id="rId20"/>
-      <p:bold r:id="rId21"/>
+      <p:regular r:id="rId21"/>
+      <p:bold r:id="rId22"/>
     </p:embeddedFont>
     <p:embeddedFont>
       <p:font typeface="Algerian" panose="04020705040A02060702" pitchFamily="82" charset="0"/>
-      <p:regular r:id="rId22"/>
+      <p:regular r:id="rId23"/>
     </p:embeddedFont>
     <p:embeddedFont>
       <p:font typeface="Baskerville Old Face" panose="02020602080505020303" pitchFamily="18" charset="0"/>
-      <p:regular r:id="rId23"/>
+      <p:regular r:id="rId24"/>
     </p:embeddedFont>
     <p:embeddedFont>
       <p:font typeface="Calibri" panose="020F0502020204030204" pitchFamily="34" charset="0"/>
-      <p:regular r:id="rId24"/>
-      <p:bold r:id="rId25"/>
-      <p:italic r:id="rId26"/>
-      <p:boldItalic r:id="rId27"/>
+      <p:regular r:id="rId25"/>
+      <p:bold r:id="rId26"/>
+      <p:italic r:id="rId27"/>
+      <p:boldItalic r:id="rId28"/>
     </p:embeddedFont>
     <p:embeddedFont>
       <p:font typeface="Noto Sans Symbols" panose="020B0502040504020204" pitchFamily="34" charset="0"/>
-      <p:regular r:id="rId28"/>
-      <p:bold r:id="rId29"/>
+      <p:regular r:id="rId29"/>
+      <p:bold r:id="rId30"/>
     </p:embeddedFont>
     <p:embeddedFont>
       <p:font typeface="Teko" panose="020B0604020202020204" charset="0"/>
-      <p:regular r:id="rId30"/>
-      <p:bold r:id="rId31"/>
+      <p:regular r:id="rId31"/>
+      <p:bold r:id="rId32"/>
     </p:embeddedFont>
   </p:embeddedFontLst>
   <p:defaultTextStyle>
@@ -305,7 +306,7 @@
       </p15:sldGuideLst>
     </p:ext>
     <p:ext uri="http://customooxmlschemas.google.com/">
-      <go:slidesCustomData xmlns="" xmlns:mc="http://schemas.openxmlformats.org/markup-compatibility/2006" xmlns:mv="urn:schemas-microsoft-com:mac:vml" xmlns:c="http://schemas.openxmlformats.org/drawingml/2006/chart" xmlns:dgm="http://schemas.openxmlformats.org/drawingml/2006/diagram" xmlns:o="urn:schemas-microsoft-com:office:office" xmlns:v="urn:schemas-microsoft-com:vml" xmlns:pvml="urn:schemas-microsoft-com:office:powerpoint" xmlns:com="http://schemas.openxmlformats.org/drawingml/2006/compatibility" xmlns:p14="http://schemas.microsoft.com/office/powerpoint/2010/main" xmlns:p15="http://schemas.microsoft.com/office/powerpoint/2012/main" xmlns:ahyp="http://schemas.microsoft.com/office/drawing/2018/hyperlinkcolor" xmlns:go="http://customooxmlschemas.google.com/" r:id="rId37" roundtripDataSignature="AMtx7mg5RoSWG1uudNDPyuk0/W+WUEiKkQ=="/>
+      <go:slidesCustomData xmlns:go="http://customooxmlschemas.google.com/" xmlns:ahyp="http://schemas.microsoft.com/office/drawing/2018/hyperlinkcolor" xmlns:p15="http://schemas.microsoft.com/office/powerpoint/2012/main" xmlns:p14="http://schemas.microsoft.com/office/powerpoint/2010/main" xmlns:com="http://schemas.openxmlformats.org/drawingml/2006/compatibility" xmlns:pvml="urn:schemas-microsoft-com:office:powerpoint" xmlns:v="urn:schemas-microsoft-com:vml" xmlns:o="urn:schemas-microsoft-com:office:office" xmlns:dgm="http://schemas.openxmlformats.org/drawingml/2006/diagram" xmlns:c="http://schemas.openxmlformats.org/drawingml/2006/chart" xmlns:mv="urn:schemas-microsoft-com:mac:vml" xmlns:mc="http://schemas.openxmlformats.org/markup-compatibility/2006" xmlns="" r:id="rId37" roundtripDataSignature="AMtx7mg5RoSWG1uudNDPyuk0/W+WUEiKkQ=="/>
     </p:ext>
   </p:extLst>
 </p:presentation>
@@ -2560,7 +2561,7 @@
             </a:pPr>
             <a:fld id="{00000000-1234-1234-1234-123412341234}" type="slidenum">
               <a:rPr lang="en-US"/>
-              <a:t>12</a:t>
+              <a:t>13</a:t>
             </a:fld>
             <a:endParaRPr/>
           </a:p>
@@ -2800,7 +2801,7 @@
             </a:pPr>
             <a:fld id="{00000000-1234-1234-1234-123412341234}" type="slidenum">
               <a:rPr lang="en-US"/>
-              <a:t>13</a:t>
+              <a:t>14</a:t>
             </a:fld>
             <a:endParaRPr/>
           </a:p>
@@ -3040,7 +3041,7 @@
             </a:pPr>
             <a:fld id="{00000000-1234-1234-1234-123412341234}" type="slidenum">
               <a:rPr lang="en-US"/>
-              <a:t>14</a:t>
+              <a:t>15</a:t>
             </a:fld>
             <a:endParaRPr/>
           </a:p>
@@ -3280,7 +3281,7 @@
             </a:pPr>
             <a:fld id="{00000000-1234-1234-1234-123412341234}" type="slidenum">
               <a:rPr lang="en-US"/>
-              <a:t>15</a:t>
+              <a:t>16</a:t>
             </a:fld>
             <a:endParaRPr/>
           </a:p>
@@ -3520,7 +3521,7 @@
             </a:pPr>
             <a:fld id="{00000000-1234-1234-1234-123412341234}" type="slidenum">
               <a:rPr lang="en-US"/>
-              <a:t>16</a:t>
+              <a:t>17</a:t>
             </a:fld>
             <a:endParaRPr/>
           </a:p>
@@ -4455,41 +4456,24 @@
           </a:bodyPr>
           <a:lstStyle/>
           <a:p>
-            <a:pPr marL="457200" lvl="0" indent="-381000" algn="l" rtl="0">
-              <a:spcBef>
-                <a:spcPts val="0"/>
-              </a:spcBef>
-              <a:spcAft>
-                <a:spcPts val="0"/>
-              </a:spcAft>
-              <a:buClr>
-                <a:schemeClr val="dk1"/>
-              </a:buClr>
-              <a:buSzPts val="1200"/>
-              <a:buFont typeface="Noto Sans Symbols"/>
+            <a:pPr marL="0" lvl="0" indent="0" algn="l" rtl="0">
+              <a:spcBef>
+                <a:spcPts val="0"/>
+              </a:spcBef>
+              <a:spcAft>
+                <a:spcPts val="0"/>
+              </a:spcAft>
               <a:buNone/>
             </a:pPr>
-            <a:endParaRPr sz="1200">
-              <a:solidFill>
-                <a:schemeClr val="dk1"/>
-              </a:solidFill>
-              <a:latin typeface="Times New Roman"/>
-              <a:ea typeface="Times New Roman"/>
-              <a:cs typeface="Times New Roman"/>
-              <a:sym typeface="Times New Roman"/>
-            </a:endParaRPr>
-          </a:p>
-          <a:p>
-            <a:pPr marL="0" lvl="0" indent="0" algn="l" rtl="0">
-              <a:spcBef>
-                <a:spcPts val="0"/>
-              </a:spcBef>
-              <a:spcAft>
-                <a:spcPts val="0"/>
-              </a:spcAft>
-              <a:buNone/>
-            </a:pPr>
-            <a:endParaRPr/>
+            <a:r>
+              <a:rPr lang="en-US" sz="1800" b="1" dirty="0">
+                <a:effectLst/>
+                <a:latin typeface="Times New Roman" panose="02020603050405020304" pitchFamily="18" charset="0"/>
+                <a:ea typeface="Times New Roman" panose="02020603050405020304" pitchFamily="18" charset="0"/>
+              </a:rPr>
+              <a:t>Client-Server + MVC + Service-oriented architecture</a:t>
+            </a:r>
+            <a:endParaRPr dirty="0"/>
           </a:p>
         </p:txBody>
       </p:sp>
@@ -6046,7 +6030,7 @@
         <p:fade/>
       </p:transition>
     </mc:Choice>
-    <mc:Fallback xmlns="" xmlns:mv="urn:schemas-microsoft-com:mac:vml" xmlns:c="http://schemas.openxmlformats.org/drawingml/2006/chart" xmlns:dgm="http://schemas.openxmlformats.org/drawingml/2006/diagram" xmlns:o="urn:schemas-microsoft-com:office:office" xmlns:v="urn:schemas-microsoft-com:vml" xmlns:pvml="urn:schemas-microsoft-com:office:powerpoint" xmlns:com="http://schemas.openxmlformats.org/drawingml/2006/compatibility" xmlns:p15="http://schemas.microsoft.com/office/powerpoint/2012/main" xmlns:ahyp="http://schemas.microsoft.com/office/drawing/2018/hyperlinkcolor">
+    <mc:Fallback xmlns:ahyp="http://schemas.microsoft.com/office/drawing/2018/hyperlinkcolor" xmlns:p15="http://schemas.microsoft.com/office/powerpoint/2012/main" xmlns:com="http://schemas.openxmlformats.org/drawingml/2006/compatibility" xmlns:pvml="urn:schemas-microsoft-com:office:powerpoint" xmlns:v="urn:schemas-microsoft-com:vml" xmlns:o="urn:schemas-microsoft-com:office:office" xmlns:dgm="http://schemas.openxmlformats.org/drawingml/2006/diagram" xmlns:c="http://schemas.openxmlformats.org/drawingml/2006/chart" xmlns:mv="urn:schemas-microsoft-com:mac:vml" xmlns="">
       <p:transition>
         <p:fade/>
       </p:transition>
@@ -6917,7 +6901,7 @@
         <p:fade/>
       </p:transition>
     </mc:Choice>
-    <mc:Fallback xmlns="" xmlns:mv="urn:schemas-microsoft-com:mac:vml" xmlns:c="http://schemas.openxmlformats.org/drawingml/2006/chart" xmlns:dgm="http://schemas.openxmlformats.org/drawingml/2006/diagram" xmlns:o="urn:schemas-microsoft-com:office:office" xmlns:v="urn:schemas-microsoft-com:vml" xmlns:pvml="urn:schemas-microsoft-com:office:powerpoint" xmlns:com="http://schemas.openxmlformats.org/drawingml/2006/compatibility" xmlns:p15="http://schemas.microsoft.com/office/powerpoint/2012/main" xmlns:ahyp="http://schemas.microsoft.com/office/drawing/2018/hyperlinkcolor">
+    <mc:Fallback xmlns:ahyp="http://schemas.microsoft.com/office/drawing/2018/hyperlinkcolor" xmlns:p15="http://schemas.microsoft.com/office/powerpoint/2012/main" xmlns:com="http://schemas.openxmlformats.org/drawingml/2006/compatibility" xmlns:pvml="urn:schemas-microsoft-com:office:powerpoint" xmlns:v="urn:schemas-microsoft-com:vml" xmlns:o="urn:schemas-microsoft-com:office:office" xmlns:dgm="http://schemas.openxmlformats.org/drawingml/2006/diagram" xmlns:c="http://schemas.openxmlformats.org/drawingml/2006/chart" xmlns:mv="urn:schemas-microsoft-com:mac:vml" xmlns="">
       <p:transition>
         <p:fade/>
       </p:transition>
@@ -7789,7 +7773,7 @@
         <p:fade/>
       </p:transition>
     </mc:Choice>
-    <mc:Fallback xmlns="" xmlns:mv="urn:schemas-microsoft-com:mac:vml" xmlns:c="http://schemas.openxmlformats.org/drawingml/2006/chart" xmlns:dgm="http://schemas.openxmlformats.org/drawingml/2006/diagram" xmlns:o="urn:schemas-microsoft-com:office:office" xmlns:v="urn:schemas-microsoft-com:vml" xmlns:pvml="urn:schemas-microsoft-com:office:powerpoint" xmlns:com="http://schemas.openxmlformats.org/drawingml/2006/compatibility" xmlns:p15="http://schemas.microsoft.com/office/powerpoint/2012/main" xmlns:ahyp="http://schemas.microsoft.com/office/drawing/2018/hyperlinkcolor">
+    <mc:Fallback xmlns:ahyp="http://schemas.microsoft.com/office/drawing/2018/hyperlinkcolor" xmlns:p15="http://schemas.microsoft.com/office/powerpoint/2012/main" xmlns:com="http://schemas.openxmlformats.org/drawingml/2006/compatibility" xmlns:pvml="urn:schemas-microsoft-com:office:powerpoint" xmlns:v="urn:schemas-microsoft-com:vml" xmlns:o="urn:schemas-microsoft-com:office:office" xmlns:dgm="http://schemas.openxmlformats.org/drawingml/2006/diagram" xmlns:c="http://schemas.openxmlformats.org/drawingml/2006/chart" xmlns:mv="urn:schemas-microsoft-com:mac:vml" xmlns="">
       <p:transition>
         <p:fade/>
       </p:transition>
@@ -8989,7 +8973,7 @@
         <p:fade/>
       </p:transition>
     </mc:Choice>
-    <mc:Fallback xmlns="" xmlns:mv="urn:schemas-microsoft-com:mac:vml" xmlns:c="http://schemas.openxmlformats.org/drawingml/2006/chart" xmlns:dgm="http://schemas.openxmlformats.org/drawingml/2006/diagram" xmlns:o="urn:schemas-microsoft-com:office:office" xmlns:v="urn:schemas-microsoft-com:vml" xmlns:pvml="urn:schemas-microsoft-com:office:powerpoint" xmlns:com="http://schemas.openxmlformats.org/drawingml/2006/compatibility" xmlns:p15="http://schemas.microsoft.com/office/powerpoint/2012/main" xmlns:ahyp="http://schemas.microsoft.com/office/drawing/2018/hyperlinkcolor">
+    <mc:Fallback xmlns:ahyp="http://schemas.microsoft.com/office/drawing/2018/hyperlinkcolor" xmlns:p15="http://schemas.microsoft.com/office/powerpoint/2012/main" xmlns:com="http://schemas.openxmlformats.org/drawingml/2006/compatibility" xmlns:pvml="urn:schemas-microsoft-com:office:powerpoint" xmlns:v="urn:schemas-microsoft-com:vml" xmlns:o="urn:schemas-microsoft-com:office:office" xmlns:dgm="http://schemas.openxmlformats.org/drawingml/2006/diagram" xmlns:c="http://schemas.openxmlformats.org/drawingml/2006/chart" xmlns:mv="urn:schemas-microsoft-com:mac:vml" xmlns="">
       <p:transition>
         <p:fade/>
       </p:transition>
@@ -9541,7 +9525,7 @@
         <p:fade/>
       </p:transition>
     </mc:Choice>
-    <mc:Fallback xmlns="" xmlns:mv="urn:schemas-microsoft-com:mac:vml" xmlns:c="http://schemas.openxmlformats.org/drawingml/2006/chart" xmlns:dgm="http://schemas.openxmlformats.org/drawingml/2006/diagram" xmlns:o="urn:schemas-microsoft-com:office:office" xmlns:v="urn:schemas-microsoft-com:vml" xmlns:pvml="urn:schemas-microsoft-com:office:powerpoint" xmlns:com="http://schemas.openxmlformats.org/drawingml/2006/compatibility" xmlns:p15="http://schemas.microsoft.com/office/powerpoint/2012/main" xmlns:ahyp="http://schemas.microsoft.com/office/drawing/2018/hyperlinkcolor">
+    <mc:Fallback xmlns:ahyp="http://schemas.microsoft.com/office/drawing/2018/hyperlinkcolor" xmlns:p15="http://schemas.microsoft.com/office/powerpoint/2012/main" xmlns:com="http://schemas.openxmlformats.org/drawingml/2006/compatibility" xmlns:pvml="urn:schemas-microsoft-com:office:powerpoint" xmlns:v="urn:schemas-microsoft-com:vml" xmlns:o="urn:schemas-microsoft-com:office:office" xmlns:dgm="http://schemas.openxmlformats.org/drawingml/2006/diagram" xmlns:c="http://schemas.openxmlformats.org/drawingml/2006/chart" xmlns:mv="urn:schemas-microsoft-com:mac:vml" xmlns="">
       <p:transition>
         <p:fade/>
       </p:transition>
@@ -10578,7 +10562,7 @@
         <p:fade/>
       </p:transition>
     </mc:Choice>
-    <mc:Fallback xmlns="" xmlns:mv="urn:schemas-microsoft-com:mac:vml" xmlns:c="http://schemas.openxmlformats.org/drawingml/2006/chart" xmlns:dgm="http://schemas.openxmlformats.org/drawingml/2006/diagram" xmlns:o="urn:schemas-microsoft-com:office:office" xmlns:v="urn:schemas-microsoft-com:vml" xmlns:pvml="urn:schemas-microsoft-com:office:powerpoint" xmlns:com="http://schemas.openxmlformats.org/drawingml/2006/compatibility" xmlns:p15="http://schemas.microsoft.com/office/powerpoint/2012/main" xmlns:ahyp="http://schemas.microsoft.com/office/drawing/2018/hyperlinkcolor">
+    <mc:Fallback xmlns:ahyp="http://schemas.microsoft.com/office/drawing/2018/hyperlinkcolor" xmlns:p15="http://schemas.microsoft.com/office/powerpoint/2012/main" xmlns:com="http://schemas.openxmlformats.org/drawingml/2006/compatibility" xmlns:pvml="urn:schemas-microsoft-com:office:powerpoint" xmlns:v="urn:schemas-microsoft-com:vml" xmlns:o="urn:schemas-microsoft-com:office:office" xmlns:dgm="http://schemas.openxmlformats.org/drawingml/2006/diagram" xmlns:c="http://schemas.openxmlformats.org/drawingml/2006/chart" xmlns:mv="urn:schemas-microsoft-com:mac:vml" xmlns="">
       <p:transition>
         <p:fade/>
       </p:transition>
@@ -11654,7 +11638,7 @@
         <p:fade/>
       </p:transition>
     </mc:Choice>
-    <mc:Fallback xmlns="" xmlns:mv="urn:schemas-microsoft-com:mac:vml" xmlns:c="http://schemas.openxmlformats.org/drawingml/2006/chart" xmlns:dgm="http://schemas.openxmlformats.org/drawingml/2006/diagram" xmlns:o="urn:schemas-microsoft-com:office:office" xmlns:v="urn:schemas-microsoft-com:vml" xmlns:pvml="urn:schemas-microsoft-com:office:powerpoint" xmlns:com="http://schemas.openxmlformats.org/drawingml/2006/compatibility" xmlns:p15="http://schemas.microsoft.com/office/powerpoint/2012/main" xmlns:ahyp="http://schemas.microsoft.com/office/drawing/2018/hyperlinkcolor">
+    <mc:Fallback xmlns:ahyp="http://schemas.microsoft.com/office/drawing/2018/hyperlinkcolor" xmlns:p15="http://schemas.microsoft.com/office/powerpoint/2012/main" xmlns:com="http://schemas.openxmlformats.org/drawingml/2006/compatibility" xmlns:pvml="urn:schemas-microsoft-com:office:powerpoint" xmlns:v="urn:schemas-microsoft-com:vml" xmlns:o="urn:schemas-microsoft-com:office:office" xmlns:dgm="http://schemas.openxmlformats.org/drawingml/2006/diagram" xmlns:c="http://schemas.openxmlformats.org/drawingml/2006/chart" xmlns:mv="urn:schemas-microsoft-com:mac:vml" xmlns="">
       <p:transition>
         <p:fade/>
       </p:transition>
@@ -12366,7 +12350,7 @@
         <p:fade/>
       </p:transition>
     </mc:Choice>
-    <mc:Fallback xmlns="" xmlns:mv="urn:schemas-microsoft-com:mac:vml" xmlns:c="http://schemas.openxmlformats.org/drawingml/2006/chart" xmlns:dgm="http://schemas.openxmlformats.org/drawingml/2006/diagram" xmlns:o="urn:schemas-microsoft-com:office:office" xmlns:v="urn:schemas-microsoft-com:vml" xmlns:pvml="urn:schemas-microsoft-com:office:powerpoint" xmlns:com="http://schemas.openxmlformats.org/drawingml/2006/compatibility" xmlns:p15="http://schemas.microsoft.com/office/powerpoint/2012/main" xmlns:ahyp="http://schemas.microsoft.com/office/drawing/2018/hyperlinkcolor">
+    <mc:Fallback xmlns:ahyp="http://schemas.microsoft.com/office/drawing/2018/hyperlinkcolor" xmlns:p15="http://schemas.microsoft.com/office/powerpoint/2012/main" xmlns:com="http://schemas.openxmlformats.org/drawingml/2006/compatibility" xmlns:pvml="urn:schemas-microsoft-com:office:powerpoint" xmlns:v="urn:schemas-microsoft-com:vml" xmlns:o="urn:schemas-microsoft-com:office:office" xmlns:dgm="http://schemas.openxmlformats.org/drawingml/2006/diagram" xmlns:c="http://schemas.openxmlformats.org/drawingml/2006/chart" xmlns:mv="urn:schemas-microsoft-com:mac:vml" xmlns="">
       <p:transition>
         <p:fade/>
       </p:transition>
@@ -13158,7 +13142,7 @@
         <p:fade/>
       </p:transition>
     </mc:Choice>
-    <mc:Fallback xmlns="" xmlns:mv="urn:schemas-microsoft-com:mac:vml" xmlns:c="http://schemas.openxmlformats.org/drawingml/2006/chart" xmlns:dgm="http://schemas.openxmlformats.org/drawingml/2006/diagram" xmlns:o="urn:schemas-microsoft-com:office:office" xmlns:v="urn:schemas-microsoft-com:vml" xmlns:pvml="urn:schemas-microsoft-com:office:powerpoint" xmlns:com="http://schemas.openxmlformats.org/drawingml/2006/compatibility" xmlns:p15="http://schemas.microsoft.com/office/powerpoint/2012/main" xmlns:ahyp="http://schemas.microsoft.com/office/drawing/2018/hyperlinkcolor">
+    <mc:Fallback xmlns:ahyp="http://schemas.microsoft.com/office/drawing/2018/hyperlinkcolor" xmlns:p15="http://schemas.microsoft.com/office/powerpoint/2012/main" xmlns:com="http://schemas.openxmlformats.org/drawingml/2006/compatibility" xmlns:pvml="urn:schemas-microsoft-com:office:powerpoint" xmlns:v="urn:schemas-microsoft-com:vml" xmlns:o="urn:schemas-microsoft-com:office:office" xmlns:dgm="http://schemas.openxmlformats.org/drawingml/2006/diagram" xmlns:c="http://schemas.openxmlformats.org/drawingml/2006/chart" xmlns:mv="urn:schemas-microsoft-com:mac:vml" xmlns="">
       <p:transition>
         <p:fade/>
       </p:transition>
@@ -14326,7 +14310,7 @@
         <p:fade/>
       </p:transition>
     </mc:Choice>
-    <mc:Fallback xmlns="" xmlns:mv="urn:schemas-microsoft-com:mac:vml" xmlns:c="http://schemas.openxmlformats.org/drawingml/2006/chart" xmlns:dgm="http://schemas.openxmlformats.org/drawingml/2006/diagram" xmlns:o="urn:schemas-microsoft-com:office:office" xmlns:v="urn:schemas-microsoft-com:vml" xmlns:pvml="urn:schemas-microsoft-com:office:powerpoint" xmlns:com="http://schemas.openxmlformats.org/drawingml/2006/compatibility" xmlns:p15="http://schemas.microsoft.com/office/powerpoint/2012/main" xmlns:ahyp="http://schemas.microsoft.com/office/drawing/2018/hyperlinkcolor">
+    <mc:Fallback xmlns:ahyp="http://schemas.microsoft.com/office/drawing/2018/hyperlinkcolor" xmlns:p15="http://schemas.microsoft.com/office/powerpoint/2012/main" xmlns:com="http://schemas.openxmlformats.org/drawingml/2006/compatibility" xmlns:pvml="urn:schemas-microsoft-com:office:powerpoint" xmlns:v="urn:schemas-microsoft-com:vml" xmlns:o="urn:schemas-microsoft-com:office:office" xmlns:dgm="http://schemas.openxmlformats.org/drawingml/2006/diagram" xmlns:c="http://schemas.openxmlformats.org/drawingml/2006/chart" xmlns:mv="urn:schemas-microsoft-com:mac:vml" xmlns="">
       <p:transition>
         <p:fade/>
       </p:transition>
@@ -15517,12 +15501,106 @@
         <p:fade/>
       </p:transition>
     </mc:Choice>
-    <mc:Fallback xmlns="" xmlns:mv="urn:schemas-microsoft-com:mac:vml" xmlns:c="http://schemas.openxmlformats.org/drawingml/2006/chart" xmlns:dgm="http://schemas.openxmlformats.org/drawingml/2006/diagram" xmlns:o="urn:schemas-microsoft-com:office:office" xmlns:v="urn:schemas-microsoft-com:vml" xmlns:pvml="urn:schemas-microsoft-com:office:powerpoint" xmlns:com="http://schemas.openxmlformats.org/drawingml/2006/compatibility" xmlns:p15="http://schemas.microsoft.com/office/powerpoint/2012/main" xmlns:ahyp="http://schemas.microsoft.com/office/drawing/2018/hyperlinkcolor">
+    <mc:Fallback xmlns:ahyp="http://schemas.microsoft.com/office/drawing/2018/hyperlinkcolor" xmlns:p15="http://schemas.microsoft.com/office/powerpoint/2012/main" xmlns:com="http://schemas.openxmlformats.org/drawingml/2006/compatibility" xmlns:pvml="urn:schemas-microsoft-com:office:powerpoint" xmlns:v="urn:schemas-microsoft-com:vml" xmlns:o="urn:schemas-microsoft-com:office:office" xmlns:dgm="http://schemas.openxmlformats.org/drawingml/2006/diagram" xmlns:c="http://schemas.openxmlformats.org/drawingml/2006/chart" xmlns:mv="urn:schemas-microsoft-com:mac:vml" xmlns="">
       <p:transition>
         <p:fade/>
       </p:transition>
     </mc:Fallback>
   </mc:AlternateContent>
+  <p:timing>
+    <p:tnLst>
+      <p:par>
+        <p:cTn id="1" dur="indefinite" restart="never" nodeType="tmRoot">
+          <p:childTnLst>
+            <p:seq concurrent="1" nextAc="seek">
+              <p:cTn id="2" dur="indefinite" nodeType="mainSeq">
+                <p:childTnLst>
+                  <p:par>
+                    <p:cTn id="3" fill="hold">
+                      <p:stCondLst>
+                        <p:cond delay="indefinite"/>
+                      </p:stCondLst>
+                      <p:childTnLst>
+                        <p:par>
+                          <p:cTn id="4" fill="hold">
+                            <p:stCondLst>
+                              <p:cond delay="0"/>
+                            </p:stCondLst>
+                            <p:childTnLst>
+                              <p:par>
+                                <p:cTn id="5" presetID="10" presetClass="entr" presetSubtype="0" fill="hold" grpId="0" nodeType="clickEffect">
+                                  <p:stCondLst>
+                                    <p:cond delay="0"/>
+                                  </p:stCondLst>
+                                  <p:childTnLst>
+                                    <p:set>
+                                      <p:cBhvr>
+                                        <p:cTn id="6" dur="1" fill="hold">
+                                          <p:stCondLst>
+                                            <p:cond delay="0"/>
+                                          </p:stCondLst>
+                                        </p:cTn>
+                                        <p:tgtEl>
+                                          <p:spTgt spid="108">
+                                            <p:txEl>
+                                              <p:pRg st="0" end="0"/>
+                                            </p:txEl>
+                                          </p:spTgt>
+                                        </p:tgtEl>
+                                        <p:attrNameLst>
+                                          <p:attrName>style.visibility</p:attrName>
+                                        </p:attrNameLst>
+                                      </p:cBhvr>
+                                      <p:to>
+                                        <p:strVal val="visible"/>
+                                      </p:to>
+                                    </p:set>
+                                    <p:animEffect transition="in" filter="fade">
+                                      <p:cBhvr>
+                                        <p:cTn id="7" dur="500"/>
+                                        <p:tgtEl>
+                                          <p:spTgt spid="108">
+                                            <p:txEl>
+                                              <p:pRg st="0" end="0"/>
+                                            </p:txEl>
+                                          </p:spTgt>
+                                        </p:tgtEl>
+                                      </p:cBhvr>
+                                    </p:animEffect>
+                                  </p:childTnLst>
+                                </p:cTn>
+                              </p:par>
+                            </p:childTnLst>
+                          </p:cTn>
+                        </p:par>
+                      </p:childTnLst>
+                    </p:cTn>
+                  </p:par>
+                </p:childTnLst>
+              </p:cTn>
+              <p:prevCondLst>
+                <p:cond evt="onPrev" delay="0">
+                  <p:tgtEl>
+                    <p:sldTgt/>
+                  </p:tgtEl>
+                </p:cond>
+              </p:prevCondLst>
+              <p:nextCondLst>
+                <p:cond evt="onNext" delay="0">
+                  <p:tgtEl>
+                    <p:sldTgt/>
+                  </p:tgtEl>
+                </p:cond>
+              </p:nextCondLst>
+            </p:seq>
+          </p:childTnLst>
+        </p:cTn>
+      </p:par>
+    </p:tnLst>
+    <p:bldLst>
+      <p:bldP spid="108" grpId="0" build="p"/>
+    </p:bldLst>
+  </p:timing>
 </p:sld>
 </file>
 
@@ -15885,13 +15963,13 @@
   <p:clrMapOvr>
     <a:masterClrMapping/>
   </p:clrMapOvr>
-  <mc:AlternateContent xmlns:mc="http://schemas.openxmlformats.org/markup-compatibility/2006" xmlns:p14="http://schemas.microsoft.com/office/powerpoint/2010/main">
-    <mc:Choice Requires="p14">
+  <mc:AlternateContent xmlns:mc="http://schemas.openxmlformats.org/markup-compatibility/2006">
+    <mc:Choice xmlns:p14="http://schemas.microsoft.com/office/powerpoint/2010/main" Requires="p14">
       <p:transition p14:dur="10">
         <p:fade/>
       </p:transition>
     </mc:Choice>
-    <mc:Fallback xmlns="">
+    <mc:Fallback>
       <p:transition>
         <p:fade/>
       </p:transition>
@@ -15901,6 +15979,116 @@
 </file>
 
 <file path=ppt/slides/slide12.xml><?xml version="1.0" encoding="utf-8"?>
+<p:sld xmlns:a="http://schemas.openxmlformats.org/drawingml/2006/main" xmlns:r="http://schemas.openxmlformats.org/officeDocument/2006/relationships" xmlns:p="http://schemas.openxmlformats.org/presentationml/2006/main">
+  <p:cSld>
+    <p:spTree>
+      <p:nvGrpSpPr>
+        <p:cNvPr id="1" name=""/>
+        <p:cNvGrpSpPr/>
+        <p:nvPr/>
+      </p:nvGrpSpPr>
+      <p:grpSpPr>
+        <a:xfrm>
+          <a:off x="0" y="0"/>
+          <a:ext cx="0" cy="0"/>
+          <a:chOff x="0" y="0"/>
+          <a:chExt cx="0" cy="0"/>
+        </a:xfrm>
+      </p:grpSpPr>
+      <p:sp>
+        <p:nvSpPr>
+          <p:cNvPr id="4" name="Slide Number Placeholder 3">
+            <a:extLst>
+              <a:ext uri="{FF2B5EF4-FFF2-40B4-BE49-F238E27FC236}">
+                <a16:creationId xmlns:a16="http://schemas.microsoft.com/office/drawing/2014/main" id="{5EBFE4DD-02AD-413A-9844-A647B21BACB1}"/>
+              </a:ext>
+            </a:extLst>
+          </p:cNvPr>
+          <p:cNvSpPr>
+            <a:spLocks noGrp="1"/>
+          </p:cNvSpPr>
+          <p:nvPr>
+            <p:ph type="sldNum" idx="12"/>
+          </p:nvPr>
+        </p:nvSpPr>
+        <p:spPr/>
+        <p:txBody>
+          <a:bodyPr/>
+          <a:lstStyle/>
+          <a:p>
+            <a:pPr marL="0" lvl="0" indent="0" algn="r" rtl="0">
+              <a:spcBef>
+                <a:spcPts val="0"/>
+              </a:spcBef>
+              <a:spcAft>
+                <a:spcPts val="0"/>
+              </a:spcAft>
+              <a:buNone/>
+            </a:pPr>
+            <a:fld id="{00000000-1234-1234-1234-123412341234}" type="slidenum">
+              <a:rPr lang="en-US" smtClean="0"/>
+              <a:t>12</a:t>
+            </a:fld>
+            <a:endParaRPr lang="en-US"/>
+          </a:p>
+        </p:txBody>
+      </p:sp>
+      <p:pic>
+        <p:nvPicPr>
+          <p:cNvPr id="6" name="Picture 5" descr="Diagram&#10;&#10;Description automatically generated">
+            <a:extLst>
+              <a:ext uri="{FF2B5EF4-FFF2-40B4-BE49-F238E27FC236}">
+                <a16:creationId xmlns:a16="http://schemas.microsoft.com/office/drawing/2014/main" id="{2FF3FD87-E0AD-4C7B-9126-2FE135D68F9B}"/>
+              </a:ext>
+            </a:extLst>
+          </p:cNvPr>
+          <p:cNvPicPr>
+            <a:picLocks noChangeAspect="1"/>
+          </p:cNvPicPr>
+          <p:nvPr/>
+        </p:nvPicPr>
+        <p:blipFill>
+          <a:blip r:embed="rId2"/>
+          <a:stretch>
+            <a:fillRect/>
+          </a:stretch>
+        </p:blipFill>
+        <p:spPr>
+          <a:xfrm>
+            <a:off x="1" y="33090"/>
+            <a:ext cx="12192000" cy="6804245"/>
+          </a:xfrm>
+          <a:prstGeom prst="rect">
+            <a:avLst/>
+          </a:prstGeom>
+        </p:spPr>
+      </p:pic>
+    </p:spTree>
+    <p:extLst>
+      <p:ext uri="{BB962C8B-B14F-4D97-AF65-F5344CB8AC3E}">
+        <p14:creationId xmlns:p14="http://schemas.microsoft.com/office/powerpoint/2010/main" val="3830659869"/>
+      </p:ext>
+    </p:extLst>
+  </p:cSld>
+  <p:clrMapOvr>
+    <a:masterClrMapping/>
+  </p:clrMapOvr>
+  <mc:AlternateContent xmlns:mc="http://schemas.openxmlformats.org/markup-compatibility/2006" xmlns:p14="http://schemas.microsoft.com/office/powerpoint/2010/main">
+    <mc:Choice Requires="p14">
+      <p:transition p14:dur="10">
+        <p:fade/>
+      </p:transition>
+    </mc:Choice>
+    <mc:Fallback xmlns:ahyp="http://schemas.microsoft.com/office/drawing/2018/hyperlinkcolor" xmlns:p15="http://schemas.microsoft.com/office/powerpoint/2012/main" xmlns:com="http://schemas.openxmlformats.org/drawingml/2006/compatibility" xmlns:pvml="urn:schemas-microsoft-com:office:powerpoint" xmlns:v="urn:schemas-microsoft-com:vml" xmlns:o="urn:schemas-microsoft-com:office:office" xmlns:dgm="http://schemas.openxmlformats.org/drawingml/2006/diagram" xmlns:c="http://schemas.openxmlformats.org/drawingml/2006/chart" xmlns:mv="urn:schemas-microsoft-com:mac:vml" xmlns="">
+      <p:transition>
+        <p:fade/>
+      </p:transition>
+    </mc:Fallback>
+  </mc:AlternateContent>
+</p:sld>
+</file>
+
+<file path=ppt/slides/slide13.xml><?xml version="1.0" encoding="utf-8"?>
 <p:sld xmlns:a="http://schemas.openxmlformats.org/drawingml/2006/main" xmlns:r="http://schemas.openxmlformats.org/officeDocument/2006/relationships" xmlns:p="http://schemas.openxmlformats.org/presentationml/2006/main">
   <p:cSld>
     <p:spTree>
@@ -15957,7 +16145,7 @@
             </a:pPr>
             <a:fld id="{00000000-1234-1234-1234-123412341234}" type="slidenum">
               <a:rPr lang="en-US"/>
-              <a:t>12</a:t>
+              <a:t>13</a:t>
             </a:fld>
             <a:endParaRPr/>
           </a:p>
@@ -16018,7 +16206,7 @@
                 <a:cs typeface="Times New Roman"/>
                 <a:sym typeface="Times New Roman"/>
               </a:rPr>
-              <a:t>Major UI – Screen Mockup</a:t>
+              <a:t>Screen Mockup</a:t>
             </a:r>
           </a:p>
         </p:txBody>
@@ -16155,7 +16343,7 @@
 </p:sld>
 </file>
 
-<file path=ppt/slides/slide13.xml><?xml version="1.0" encoding="utf-8"?>
+<file path=ppt/slides/slide14.xml><?xml version="1.0" encoding="utf-8"?>
 <p:sld xmlns:a="http://schemas.openxmlformats.org/drawingml/2006/main" xmlns:r="http://schemas.openxmlformats.org/officeDocument/2006/relationships" xmlns:p="http://schemas.openxmlformats.org/presentationml/2006/main">
   <p:cSld>
     <p:spTree>
@@ -16212,7 +16400,7 @@
             </a:pPr>
             <a:fld id="{00000000-1234-1234-1234-123412341234}" type="slidenum">
               <a:rPr lang="en-US"/>
-              <a:t>13</a:t>
+              <a:t>14</a:t>
             </a:fld>
             <a:endParaRPr/>
           </a:p>
@@ -16273,7 +16461,7 @@
                 <a:cs typeface="Times New Roman"/>
                 <a:sym typeface="Times New Roman"/>
               </a:rPr>
-              <a:t>Major UI – Screen Mockup</a:t>
+              <a:t>Screen Mockup</a:t>
             </a:r>
           </a:p>
         </p:txBody>
@@ -16342,322 +16530,6 @@
 </p:sld>
 </file>
 
-<file path=ppt/slides/slide14.xml><?xml version="1.0" encoding="utf-8"?>
-<p:sld xmlns:a="http://schemas.openxmlformats.org/drawingml/2006/main" xmlns:r="http://schemas.openxmlformats.org/officeDocument/2006/relationships" xmlns:p="http://schemas.openxmlformats.org/presentationml/2006/main">
-  <p:cSld>
-    <p:spTree>
-      <p:nvGrpSpPr>
-        <p:cNvPr id="1" name="Shape 258"/>
-        <p:cNvGrpSpPr/>
-        <p:nvPr/>
-      </p:nvGrpSpPr>
-      <p:grpSpPr>
-        <a:xfrm>
-          <a:off x="0" y="0"/>
-          <a:ext cx="0" cy="0"/>
-          <a:chOff x="0" y="0"/>
-          <a:chExt cx="0" cy="0"/>
-        </a:xfrm>
-      </p:grpSpPr>
-      <p:sp>
-        <p:nvSpPr>
-          <p:cNvPr id="259" name="Google Shape;259;p9"/>
-          <p:cNvSpPr txBox="1">
-            <a:spLocks noGrp="1"/>
-          </p:cNvSpPr>
-          <p:nvPr>
-            <p:ph type="sldNum" idx="12"/>
-          </p:nvPr>
-        </p:nvSpPr>
-        <p:spPr>
-          <a:xfrm>
-            <a:off x="9900458" y="6459785"/>
-            <a:ext cx="1312025" cy="365125"/>
-          </a:xfrm>
-          <a:prstGeom prst="rect">
-            <a:avLst/>
-          </a:prstGeom>
-          <a:noFill/>
-          <a:ln>
-            <a:noFill/>
-          </a:ln>
-        </p:spPr>
-        <p:txBody>
-          <a:bodyPr spcFirstLastPara="1" wrap="square" lIns="91425" tIns="45700" rIns="91425" bIns="45700" anchor="ctr" anchorCtr="0">
-            <a:noAutofit/>
-          </a:bodyPr>
-          <a:lstStyle/>
-          <a:p>
-            <a:pPr marL="0" lvl="0" indent="0" algn="r" rtl="0">
-              <a:spcBef>
-                <a:spcPts val="0"/>
-              </a:spcBef>
-              <a:spcAft>
-                <a:spcPts val="0"/>
-              </a:spcAft>
-              <a:buNone/>
-            </a:pPr>
-            <a:fld id="{00000000-1234-1234-1234-123412341234}" type="slidenum">
-              <a:rPr lang="en-US"/>
-              <a:t>14</a:t>
-            </a:fld>
-            <a:endParaRPr/>
-          </a:p>
-        </p:txBody>
-      </p:sp>
-      <p:sp>
-        <p:nvSpPr>
-          <p:cNvPr id="260" name="Google Shape;260;p9"/>
-          <p:cNvSpPr txBox="1">
-            <a:spLocks noGrp="1"/>
-          </p:cNvSpPr>
-          <p:nvPr>
-            <p:ph type="title" idx="4294967295"/>
-          </p:nvPr>
-        </p:nvSpPr>
-        <p:spPr>
-          <a:xfrm>
-            <a:off x="995467" y="33090"/>
-            <a:ext cx="10201066" cy="979488"/>
-          </a:xfrm>
-          <a:prstGeom prst="rect">
-            <a:avLst/>
-          </a:prstGeom>
-          <a:noFill/>
-          <a:ln>
-            <a:noFill/>
-          </a:ln>
-        </p:spPr>
-        <p:txBody>
-          <a:bodyPr spcFirstLastPara="1" wrap="square" lIns="91425" tIns="45700" rIns="91425" bIns="45700" anchor="b" anchorCtr="0">
-            <a:noAutofit/>
-          </a:bodyPr>
-          <a:lstStyle/>
-          <a:p>
-            <a:pPr marL="0" lvl="0" indent="0" algn="ctr" rtl="0">
-              <a:lnSpc>
-                <a:spcPct val="85000"/>
-              </a:lnSpc>
-              <a:spcBef>
-                <a:spcPts val="0"/>
-              </a:spcBef>
-              <a:spcAft>
-                <a:spcPts val="0"/>
-              </a:spcAft>
-              <a:buClr>
-                <a:schemeClr val="dk1"/>
-              </a:buClr>
-              <a:buSzPts val="7200"/>
-              <a:buFont typeface="Times New Roman"/>
-              <a:buNone/>
-            </a:pPr>
-            <a:r>
-              <a:rPr lang="en-US" sz="7200" b="1" dirty="0">
-                <a:solidFill>
-                  <a:schemeClr val="dk1"/>
-                </a:solidFill>
-                <a:latin typeface="Times New Roman"/>
-                <a:cs typeface="Times New Roman"/>
-                <a:sym typeface="Times New Roman"/>
-              </a:rPr>
-              <a:t>Future Scope</a:t>
-            </a:r>
-          </a:p>
-        </p:txBody>
-      </p:sp>
-      <p:sp>
-        <p:nvSpPr>
-          <p:cNvPr id="8" name="Google Shape;261;p9">
-            <a:extLst>
-              <a:ext uri="{FF2B5EF4-FFF2-40B4-BE49-F238E27FC236}">
-                <a16:creationId xmlns:a16="http://schemas.microsoft.com/office/drawing/2014/main" id="{BB6931AC-0AE3-4392-A9FF-0BA7E9066200}"/>
-              </a:ext>
-            </a:extLst>
-          </p:cNvPr>
-          <p:cNvSpPr txBox="1"/>
-          <p:nvPr/>
-        </p:nvSpPr>
-        <p:spPr>
-          <a:xfrm>
-            <a:off x="195943" y="1186543"/>
-            <a:ext cx="11800114" cy="5029200"/>
-          </a:xfrm>
-          <a:prstGeom prst="rect">
-            <a:avLst/>
-          </a:prstGeom>
-          <a:noFill/>
-          <a:ln>
-            <a:noFill/>
-          </a:ln>
-        </p:spPr>
-        <p:txBody>
-          <a:bodyPr spcFirstLastPara="1" wrap="square" lIns="91425" tIns="45700" rIns="91425" bIns="45700" anchor="t" anchorCtr="0">
-            <a:noAutofit/>
-          </a:bodyPr>
-          <a:lstStyle/>
-          <a:p>
-            <a:pPr marL="514350" marR="0" indent="-514350">
-              <a:lnSpc>
-                <a:spcPct val="150000"/>
-              </a:lnSpc>
-              <a:spcBef>
-                <a:spcPts val="0"/>
-              </a:spcBef>
-              <a:spcAft>
-                <a:spcPts val="0"/>
-              </a:spcAft>
-              <a:buFont typeface="+mj-lt"/>
-              <a:buAutoNum type="arabicPeriod"/>
-            </a:pPr>
-            <a:r>
-              <a:rPr lang="en-US" sz="2800">
-                <a:latin typeface="Times New Roman" panose="02020603050405020304" pitchFamily="18" charset="0"/>
-                <a:cs typeface="Times New Roman" panose="02020603050405020304" pitchFamily="18" charset="0"/>
-              </a:rPr>
-              <a:t>Bidding </a:t>
-            </a:r>
-            <a:r>
-              <a:rPr lang="en-US" sz="2800" dirty="0">
-                <a:latin typeface="Times New Roman" panose="02020603050405020304" pitchFamily="18" charset="0"/>
-                <a:cs typeface="Times New Roman" panose="02020603050405020304" pitchFamily="18" charset="0"/>
-              </a:rPr>
-              <a:t>processing with bidding service</a:t>
-            </a:r>
-          </a:p>
-          <a:p>
-            <a:pPr marL="514350" marR="0" indent="-514350">
-              <a:lnSpc>
-                <a:spcPct val="150000"/>
-              </a:lnSpc>
-              <a:spcBef>
-                <a:spcPts val="0"/>
-              </a:spcBef>
-              <a:spcAft>
-                <a:spcPts val="0"/>
-              </a:spcAft>
-              <a:buFont typeface="+mj-lt"/>
-              <a:buAutoNum type="arabicPeriod"/>
-            </a:pPr>
-            <a:r>
-              <a:rPr lang="en-US" sz="2800" dirty="0">
-                <a:latin typeface="Times New Roman" panose="02020603050405020304" pitchFamily="18" charset="0"/>
-                <a:cs typeface="Times New Roman" panose="02020603050405020304" pitchFamily="18" charset="0"/>
-              </a:rPr>
-              <a:t>Implementing the Architectural Design with optimistic locking and multithreading</a:t>
-            </a:r>
-          </a:p>
-          <a:p>
-            <a:pPr marL="514350" marR="0" indent="-514350">
-              <a:lnSpc>
-                <a:spcPct val="150000"/>
-              </a:lnSpc>
-              <a:spcBef>
-                <a:spcPts val="0"/>
-              </a:spcBef>
-              <a:spcAft>
-                <a:spcPts val="0"/>
-              </a:spcAft>
-              <a:buFont typeface="+mj-lt"/>
-              <a:buAutoNum type="arabicPeriod"/>
-            </a:pPr>
-            <a:r>
-              <a:rPr lang="en-US" sz="2800" dirty="0">
-                <a:latin typeface="Times New Roman" panose="02020603050405020304" pitchFamily="18" charset="0"/>
-                <a:cs typeface="Times New Roman" panose="02020603050405020304" pitchFamily="18" charset="0"/>
-              </a:rPr>
-              <a:t>Integrate payment system</a:t>
-            </a:r>
-          </a:p>
-          <a:p>
-            <a:pPr marL="514350" marR="0" indent="-514350">
-              <a:lnSpc>
-                <a:spcPct val="150000"/>
-              </a:lnSpc>
-              <a:spcBef>
-                <a:spcPts val="0"/>
-              </a:spcBef>
-              <a:spcAft>
-                <a:spcPts val="0"/>
-              </a:spcAft>
-              <a:buFont typeface="+mj-lt"/>
-              <a:buAutoNum type="arabicPeriod"/>
-            </a:pPr>
-            <a:r>
-              <a:rPr lang="en-US" sz="2800" dirty="0">
-                <a:latin typeface="Times New Roman" panose="02020603050405020304" pitchFamily="18" charset="0"/>
-                <a:cs typeface="Times New Roman" panose="02020603050405020304" pitchFamily="18" charset="0"/>
-              </a:rPr>
-              <a:t>Performing Testing</a:t>
-            </a:r>
-          </a:p>
-          <a:p>
-            <a:pPr marL="514350" marR="0" indent="-514350">
-              <a:lnSpc>
-                <a:spcPct val="150000"/>
-              </a:lnSpc>
-              <a:spcBef>
-                <a:spcPts val="0"/>
-              </a:spcBef>
-              <a:spcAft>
-                <a:spcPts val="0"/>
-              </a:spcAft>
-              <a:buFont typeface="+mj-lt"/>
-              <a:buAutoNum type="arabicPeriod"/>
-            </a:pPr>
-            <a:r>
-              <a:rPr lang="en-US" sz="2800" dirty="0">
-                <a:latin typeface="Times New Roman" panose="02020603050405020304" pitchFamily="18" charset="0"/>
-                <a:cs typeface="Times New Roman" panose="02020603050405020304" pitchFamily="18" charset="0"/>
-              </a:rPr>
-              <a:t>Scientific Report</a:t>
-            </a:r>
-          </a:p>
-          <a:p>
-            <a:pPr marL="514350" marR="0" indent="-514350">
-              <a:lnSpc>
-                <a:spcPct val="150000"/>
-              </a:lnSpc>
-              <a:spcBef>
-                <a:spcPts val="0"/>
-              </a:spcBef>
-              <a:spcAft>
-                <a:spcPts val="0"/>
-              </a:spcAft>
-              <a:buFont typeface="+mj-lt"/>
-              <a:buAutoNum type="arabicPeriod"/>
-            </a:pPr>
-            <a:endParaRPr lang="en-US" sz="2800" dirty="0">
-              <a:latin typeface="Times New Roman" panose="02020603050405020304" pitchFamily="18" charset="0"/>
-              <a:cs typeface="Times New Roman" panose="02020603050405020304" pitchFamily="18" charset="0"/>
-            </a:endParaRPr>
-          </a:p>
-        </p:txBody>
-      </p:sp>
-    </p:spTree>
-    <p:extLst>
-      <p:ext uri="{BB962C8B-B14F-4D97-AF65-F5344CB8AC3E}">
-        <p14:creationId xmlns:p14="http://schemas.microsoft.com/office/powerpoint/2010/main" val="4008362308"/>
-      </p:ext>
-    </p:extLst>
-  </p:cSld>
-  <p:clrMapOvr>
-    <a:masterClrMapping/>
-  </p:clrMapOvr>
-  <mc:AlternateContent xmlns:mc="http://schemas.openxmlformats.org/markup-compatibility/2006" xmlns:p14="http://schemas.microsoft.com/office/powerpoint/2010/main">
-    <mc:Choice Requires="p14">
-      <p:transition p14:dur="10">
-        <p:fade/>
-      </p:transition>
-    </mc:Choice>
-    <mc:Fallback xmlns="">
-      <p:transition>
-        <p:fade/>
-      </p:transition>
-    </mc:Fallback>
-  </mc:AlternateContent>
-</p:sld>
-</file>
-
 <file path=ppt/slides/slide15.xml><?xml version="1.0" encoding="utf-8"?>
 <p:sld xmlns:a="http://schemas.openxmlformats.org/drawingml/2006/main" xmlns:r="http://schemas.openxmlformats.org/officeDocument/2006/relationships" xmlns:p="http://schemas.openxmlformats.org/presentationml/2006/main">
   <p:cSld>
@@ -16733,8 +16605,8 @@
         </p:nvSpPr>
         <p:spPr>
           <a:xfrm>
-            <a:off x="995467" y="1924051"/>
-            <a:ext cx="10201066" cy="1714500"/>
+            <a:off x="995467" y="33090"/>
+            <a:ext cx="10201066" cy="979488"/>
           </a:xfrm>
           <a:prstGeom prst="rect">
             <a:avLst/>
@@ -16768,7 +16640,7 @@
               <a:buNone/>
             </a:pPr>
             <a:r>
-              <a:rPr lang="en-US" sz="11500" b="1" dirty="0">
+              <a:rPr lang="en-US" sz="7200" b="1" dirty="0">
                 <a:solidFill>
                   <a:schemeClr val="dk1"/>
                 </a:solidFill>
@@ -16776,15 +16648,183 @@
                 <a:cs typeface="Times New Roman"/>
                 <a:sym typeface="Times New Roman"/>
               </a:rPr>
-              <a:t>Real-demo</a:t>
+              <a:t>Future Scope</a:t>
             </a:r>
+          </a:p>
+        </p:txBody>
+      </p:sp>
+      <p:sp>
+        <p:nvSpPr>
+          <p:cNvPr id="8" name="Google Shape;261;p9">
+            <a:extLst>
+              <a:ext uri="{FF2B5EF4-FFF2-40B4-BE49-F238E27FC236}">
+                <a16:creationId xmlns:a16="http://schemas.microsoft.com/office/drawing/2014/main" id="{BB6931AC-0AE3-4392-A9FF-0BA7E9066200}"/>
+              </a:ext>
+            </a:extLst>
+          </p:cNvPr>
+          <p:cNvSpPr txBox="1"/>
+          <p:nvPr/>
+        </p:nvSpPr>
+        <p:spPr>
+          <a:xfrm>
+            <a:off x="195943" y="1186543"/>
+            <a:ext cx="11800114" cy="5029200"/>
+          </a:xfrm>
+          <a:prstGeom prst="rect">
+            <a:avLst/>
+          </a:prstGeom>
+          <a:noFill/>
+          <a:ln>
+            <a:noFill/>
+          </a:ln>
+        </p:spPr>
+        <p:txBody>
+          <a:bodyPr spcFirstLastPara="1" wrap="square" lIns="91425" tIns="45700" rIns="91425" bIns="45700" anchor="t" anchorCtr="0">
+            <a:noAutofit/>
+          </a:bodyPr>
+          <a:lstStyle/>
+          <a:p>
+            <a:pPr marL="514350" marR="0" indent="-514350">
+              <a:lnSpc>
+                <a:spcPct val="150000"/>
+              </a:lnSpc>
+              <a:spcBef>
+                <a:spcPts val="0"/>
+              </a:spcBef>
+              <a:spcAft>
+                <a:spcPts val="0"/>
+              </a:spcAft>
+              <a:buFont typeface="+mj-lt"/>
+              <a:buAutoNum type="arabicPeriod"/>
+            </a:pPr>
+            <a:r>
+              <a:rPr lang="en-US" sz="2800">
+                <a:latin typeface="Times New Roman" panose="02020603050405020304" pitchFamily="18" charset="0"/>
+                <a:cs typeface="Times New Roman" panose="02020603050405020304" pitchFamily="18" charset="0"/>
+              </a:rPr>
+              <a:t>Bidding </a:t>
+            </a:r>
+            <a:r>
+              <a:rPr lang="en-US" sz="2800" dirty="0">
+                <a:latin typeface="Times New Roman" panose="02020603050405020304" pitchFamily="18" charset="0"/>
+                <a:cs typeface="Times New Roman" panose="02020603050405020304" pitchFamily="18" charset="0"/>
+              </a:rPr>
+              <a:t>processing with bidding service</a:t>
+            </a:r>
+          </a:p>
+          <a:p>
+            <a:pPr marL="514350" marR="0" indent="-514350">
+              <a:lnSpc>
+                <a:spcPct val="150000"/>
+              </a:lnSpc>
+              <a:spcBef>
+                <a:spcPts val="0"/>
+              </a:spcBef>
+              <a:spcAft>
+                <a:spcPts val="0"/>
+              </a:spcAft>
+              <a:buFont typeface="+mj-lt"/>
+              <a:buAutoNum type="arabicPeriod"/>
+            </a:pPr>
+            <a:r>
+              <a:rPr lang="en-US" sz="2800" dirty="0">
+                <a:latin typeface="Times New Roman" panose="02020603050405020304" pitchFamily="18" charset="0"/>
+                <a:cs typeface="Times New Roman" panose="02020603050405020304" pitchFamily="18" charset="0"/>
+              </a:rPr>
+              <a:t>Implementing the Architectural Design with optimistic locking and multithreading</a:t>
+            </a:r>
+          </a:p>
+          <a:p>
+            <a:pPr marL="514350" marR="0" indent="-514350">
+              <a:lnSpc>
+                <a:spcPct val="150000"/>
+              </a:lnSpc>
+              <a:spcBef>
+                <a:spcPts val="0"/>
+              </a:spcBef>
+              <a:spcAft>
+                <a:spcPts val="0"/>
+              </a:spcAft>
+              <a:buFont typeface="+mj-lt"/>
+              <a:buAutoNum type="arabicPeriod"/>
+            </a:pPr>
+            <a:r>
+              <a:rPr lang="en-US" sz="2800" dirty="0">
+                <a:latin typeface="Times New Roman" panose="02020603050405020304" pitchFamily="18" charset="0"/>
+                <a:cs typeface="Times New Roman" panose="02020603050405020304" pitchFamily="18" charset="0"/>
+              </a:rPr>
+              <a:t>Integrate payment system</a:t>
+            </a:r>
+          </a:p>
+          <a:p>
+            <a:pPr marL="514350" marR="0" indent="-514350">
+              <a:lnSpc>
+                <a:spcPct val="150000"/>
+              </a:lnSpc>
+              <a:spcBef>
+                <a:spcPts val="0"/>
+              </a:spcBef>
+              <a:spcAft>
+                <a:spcPts val="0"/>
+              </a:spcAft>
+              <a:buFont typeface="+mj-lt"/>
+              <a:buAutoNum type="arabicPeriod"/>
+            </a:pPr>
+            <a:r>
+              <a:rPr lang="en-US" sz="2800" dirty="0">
+                <a:latin typeface="Times New Roman" panose="02020603050405020304" pitchFamily="18" charset="0"/>
+                <a:cs typeface="Times New Roman" panose="02020603050405020304" pitchFamily="18" charset="0"/>
+              </a:rPr>
+              <a:t>Performing Testing</a:t>
+            </a:r>
+          </a:p>
+          <a:p>
+            <a:pPr marL="514350" marR="0" indent="-514350">
+              <a:lnSpc>
+                <a:spcPct val="150000"/>
+              </a:lnSpc>
+              <a:spcBef>
+                <a:spcPts val="0"/>
+              </a:spcBef>
+              <a:spcAft>
+                <a:spcPts val="0"/>
+              </a:spcAft>
+              <a:buFont typeface="+mj-lt"/>
+              <a:buAutoNum type="arabicPeriod"/>
+            </a:pPr>
+            <a:r>
+              <a:rPr lang="en-US" sz="2800" dirty="0">
+                <a:latin typeface="Times New Roman" panose="02020603050405020304" pitchFamily="18" charset="0"/>
+                <a:cs typeface="Times New Roman" panose="02020603050405020304" pitchFamily="18" charset="0"/>
+              </a:rPr>
+              <a:t>Scientific Report</a:t>
+            </a:r>
+          </a:p>
+          <a:p>
+            <a:pPr marL="514350" marR="0" indent="-514350">
+              <a:lnSpc>
+                <a:spcPct val="150000"/>
+              </a:lnSpc>
+              <a:spcBef>
+                <a:spcPts val="0"/>
+              </a:spcBef>
+              <a:spcAft>
+                <a:spcPts val="0"/>
+              </a:spcAft>
+              <a:buFont typeface="+mj-lt"/>
+              <a:buAutoNum type="arabicPeriod"/>
+            </a:pPr>
+            <a:endParaRPr lang="en-US" sz="2800" dirty="0">
+              <a:latin typeface="Times New Roman" panose="02020603050405020304" pitchFamily="18" charset="0"/>
+              <a:cs typeface="Times New Roman" panose="02020603050405020304" pitchFamily="18" charset="0"/>
+            </a:endParaRPr>
           </a:p>
         </p:txBody>
       </p:sp>
     </p:spTree>
     <p:extLst>
       <p:ext uri="{BB962C8B-B14F-4D97-AF65-F5344CB8AC3E}">
-        <p14:creationId xmlns:p14="http://schemas.microsoft.com/office/powerpoint/2010/main" val="1002263078"/>
+        <p14:creationId xmlns:p14="http://schemas.microsoft.com/office/powerpoint/2010/main" val="4008362308"/>
       </p:ext>
     </p:extLst>
   </p:cSld>
@@ -16864,6 +16904,154 @@
             <a:fld id="{00000000-1234-1234-1234-123412341234}" type="slidenum">
               <a:rPr lang="en-US"/>
               <a:t>16</a:t>
+            </a:fld>
+            <a:endParaRPr/>
+          </a:p>
+        </p:txBody>
+      </p:sp>
+      <p:sp>
+        <p:nvSpPr>
+          <p:cNvPr id="260" name="Google Shape;260;p9"/>
+          <p:cNvSpPr txBox="1">
+            <a:spLocks noGrp="1"/>
+          </p:cNvSpPr>
+          <p:nvPr>
+            <p:ph type="title" idx="4294967295"/>
+          </p:nvPr>
+        </p:nvSpPr>
+        <p:spPr>
+          <a:xfrm>
+            <a:off x="995467" y="1924051"/>
+            <a:ext cx="10201066" cy="1714500"/>
+          </a:xfrm>
+          <a:prstGeom prst="rect">
+            <a:avLst/>
+          </a:prstGeom>
+          <a:noFill/>
+          <a:ln>
+            <a:noFill/>
+          </a:ln>
+        </p:spPr>
+        <p:txBody>
+          <a:bodyPr spcFirstLastPara="1" wrap="square" lIns="91425" tIns="45700" rIns="91425" bIns="45700" anchor="b" anchorCtr="0">
+            <a:noAutofit/>
+          </a:bodyPr>
+          <a:lstStyle/>
+          <a:p>
+            <a:pPr marL="0" lvl="0" indent="0" algn="ctr" rtl="0">
+              <a:lnSpc>
+                <a:spcPct val="85000"/>
+              </a:lnSpc>
+              <a:spcBef>
+                <a:spcPts val="0"/>
+              </a:spcBef>
+              <a:spcAft>
+                <a:spcPts val="0"/>
+              </a:spcAft>
+              <a:buClr>
+                <a:schemeClr val="dk1"/>
+              </a:buClr>
+              <a:buSzPts val="7200"/>
+              <a:buFont typeface="Times New Roman"/>
+              <a:buNone/>
+            </a:pPr>
+            <a:r>
+              <a:rPr lang="en-US" sz="11500" b="1" dirty="0">
+                <a:solidFill>
+                  <a:schemeClr val="dk1"/>
+                </a:solidFill>
+                <a:latin typeface="Times New Roman"/>
+                <a:cs typeface="Times New Roman"/>
+                <a:sym typeface="Times New Roman"/>
+              </a:rPr>
+              <a:t>Real-demo</a:t>
+            </a:r>
+          </a:p>
+        </p:txBody>
+      </p:sp>
+    </p:spTree>
+    <p:extLst>
+      <p:ext uri="{BB962C8B-B14F-4D97-AF65-F5344CB8AC3E}">
+        <p14:creationId xmlns:p14="http://schemas.microsoft.com/office/powerpoint/2010/main" val="1002263078"/>
+      </p:ext>
+    </p:extLst>
+  </p:cSld>
+  <p:clrMapOvr>
+    <a:masterClrMapping/>
+  </p:clrMapOvr>
+  <mc:AlternateContent xmlns:mc="http://schemas.openxmlformats.org/markup-compatibility/2006" xmlns:p14="http://schemas.microsoft.com/office/powerpoint/2010/main">
+    <mc:Choice Requires="p14">
+      <p:transition p14:dur="10">
+        <p:fade/>
+      </p:transition>
+    </mc:Choice>
+    <mc:Fallback xmlns="">
+      <p:transition>
+        <p:fade/>
+      </p:transition>
+    </mc:Fallback>
+  </mc:AlternateContent>
+</p:sld>
+</file>
+
+<file path=ppt/slides/slide17.xml><?xml version="1.0" encoding="utf-8"?>
+<p:sld xmlns:a="http://schemas.openxmlformats.org/drawingml/2006/main" xmlns:r="http://schemas.openxmlformats.org/officeDocument/2006/relationships" xmlns:p="http://schemas.openxmlformats.org/presentationml/2006/main">
+  <p:cSld>
+    <p:spTree>
+      <p:nvGrpSpPr>
+        <p:cNvPr id="1" name="Shape 258"/>
+        <p:cNvGrpSpPr/>
+        <p:nvPr/>
+      </p:nvGrpSpPr>
+      <p:grpSpPr>
+        <a:xfrm>
+          <a:off x="0" y="0"/>
+          <a:ext cx="0" cy="0"/>
+          <a:chOff x="0" y="0"/>
+          <a:chExt cx="0" cy="0"/>
+        </a:xfrm>
+      </p:grpSpPr>
+      <p:sp>
+        <p:nvSpPr>
+          <p:cNvPr id="259" name="Google Shape;259;p9"/>
+          <p:cNvSpPr txBox="1">
+            <a:spLocks noGrp="1"/>
+          </p:cNvSpPr>
+          <p:nvPr>
+            <p:ph type="sldNum" idx="12"/>
+          </p:nvPr>
+        </p:nvSpPr>
+        <p:spPr>
+          <a:xfrm>
+            <a:off x="9900458" y="6459785"/>
+            <a:ext cx="1312025" cy="365125"/>
+          </a:xfrm>
+          <a:prstGeom prst="rect">
+            <a:avLst/>
+          </a:prstGeom>
+          <a:noFill/>
+          <a:ln>
+            <a:noFill/>
+          </a:ln>
+        </p:spPr>
+        <p:txBody>
+          <a:bodyPr spcFirstLastPara="1" wrap="square" lIns="91425" tIns="45700" rIns="91425" bIns="45700" anchor="ctr" anchorCtr="0">
+            <a:noAutofit/>
+          </a:bodyPr>
+          <a:lstStyle/>
+          <a:p>
+            <a:pPr marL="0" lvl="0" indent="0" algn="r" rtl="0">
+              <a:spcBef>
+                <a:spcPts val="0"/>
+              </a:spcBef>
+              <a:spcAft>
+                <a:spcPts val="0"/>
+              </a:spcAft>
+              <a:buNone/>
+            </a:pPr>
+            <a:fld id="{00000000-1234-1234-1234-123412341234}" type="slidenum">
+              <a:rPr lang="en-US"/>
+              <a:t>17</a:t>
             </a:fld>
             <a:endParaRPr/>
           </a:p>
@@ -17197,7 +17385,7 @@
         <p:fade/>
       </p:transition>
     </mc:Choice>
-    <mc:Fallback xmlns="" xmlns:mv="urn:schemas-microsoft-com:mac:vml" xmlns:c="http://schemas.openxmlformats.org/drawingml/2006/chart" xmlns:dgm="http://schemas.openxmlformats.org/drawingml/2006/diagram" xmlns:o="urn:schemas-microsoft-com:office:office" xmlns:v="urn:schemas-microsoft-com:vml" xmlns:pvml="urn:schemas-microsoft-com:office:powerpoint" xmlns:com="http://schemas.openxmlformats.org/drawingml/2006/compatibility" xmlns:p15="http://schemas.microsoft.com/office/powerpoint/2012/main" xmlns:ahyp="http://schemas.microsoft.com/office/drawing/2018/hyperlinkcolor">
+    <mc:Fallback xmlns:ahyp="http://schemas.microsoft.com/office/drawing/2018/hyperlinkcolor" xmlns:p15="http://schemas.microsoft.com/office/powerpoint/2012/main" xmlns:com="http://schemas.openxmlformats.org/drawingml/2006/compatibility" xmlns:pvml="urn:schemas-microsoft-com:office:powerpoint" xmlns:v="urn:schemas-microsoft-com:vml" xmlns:o="urn:schemas-microsoft-com:office:office" xmlns:dgm="http://schemas.openxmlformats.org/drawingml/2006/diagram" xmlns:c="http://schemas.openxmlformats.org/drawingml/2006/chart" xmlns:mv="urn:schemas-microsoft-com:mac:vml" xmlns="">
       <p:transition>
         <p:fade/>
       </p:transition>
@@ -17395,7 +17583,7 @@
 </p:sld>
 </file>
 
-<file path=ppt/slides/slide17.xml><?xml version="1.0" encoding="utf-8"?>
+<file path=ppt/slides/slide18.xml><?xml version="1.0" encoding="utf-8"?>
 <p:sld xmlns:a="http://schemas.openxmlformats.org/drawingml/2006/main" xmlns:r="http://schemas.openxmlformats.org/officeDocument/2006/relationships" xmlns:p="http://schemas.openxmlformats.org/presentationml/2006/main">
   <p:cSld>
     <p:spTree>
@@ -17452,7 +17640,7 @@
             </a:pPr>
             <a:fld id="{00000000-1234-1234-1234-123412341234}" type="slidenum">
               <a:rPr lang="en-US"/>
-              <a:t>17</a:t>
+              <a:t>18</a:t>
             </a:fld>
             <a:endParaRPr/>
           </a:p>
@@ -17651,7 +17839,7 @@
         <p:fade/>
       </p:transition>
     </mc:Choice>
-    <mc:Fallback xmlns="" xmlns:mv="urn:schemas-microsoft-com:mac:vml" xmlns:c="http://schemas.openxmlformats.org/drawingml/2006/chart" xmlns:dgm="http://schemas.openxmlformats.org/drawingml/2006/diagram" xmlns:o="urn:schemas-microsoft-com:office:office" xmlns:v="urn:schemas-microsoft-com:vml" xmlns:pvml="urn:schemas-microsoft-com:office:powerpoint" xmlns:com="http://schemas.openxmlformats.org/drawingml/2006/compatibility" xmlns:p15="http://schemas.microsoft.com/office/powerpoint/2012/main" xmlns:ahyp="http://schemas.microsoft.com/office/drawing/2018/hyperlinkcolor">
+    <mc:Fallback xmlns:ahyp="http://schemas.microsoft.com/office/drawing/2018/hyperlinkcolor" xmlns:p15="http://schemas.microsoft.com/office/powerpoint/2012/main" xmlns:com="http://schemas.openxmlformats.org/drawingml/2006/compatibility" xmlns:pvml="urn:schemas-microsoft-com:office:powerpoint" xmlns:v="urn:schemas-microsoft-com:vml" xmlns:o="urn:schemas-microsoft-com:office:office" xmlns:dgm="http://schemas.openxmlformats.org/drawingml/2006/diagram" xmlns:c="http://schemas.openxmlformats.org/drawingml/2006/chart" xmlns:mv="urn:schemas-microsoft-com:mac:vml" xmlns="">
       <p:transition>
         <p:fade/>
       </p:transition>
@@ -19548,6 +19736,53 @@
           </a:p>
         </p:txBody>
       </p:sp>
+      <p:sp>
+        <p:nvSpPr>
+          <p:cNvPr id="6" name="TextBox 5">
+            <a:extLst>
+              <a:ext uri="{FF2B5EF4-FFF2-40B4-BE49-F238E27FC236}">
+                <a16:creationId xmlns:a16="http://schemas.microsoft.com/office/drawing/2014/main" id="{C8FEC439-8E4D-404A-91B9-F8FE94A5944F}"/>
+              </a:ext>
+            </a:extLst>
+          </p:cNvPr>
+          <p:cNvSpPr txBox="1"/>
+          <p:nvPr/>
+        </p:nvSpPr>
+        <p:spPr>
+          <a:xfrm>
+            <a:off x="-9524" y="6488458"/>
+            <a:ext cx="6105524" cy="338554"/>
+          </a:xfrm>
+          <a:prstGeom prst="rect">
+            <a:avLst/>
+          </a:prstGeom>
+          <a:noFill/>
+        </p:spPr>
+        <p:txBody>
+          <a:bodyPr wrap="square">
+            <a:spAutoFit/>
+          </a:bodyPr>
+          <a:lstStyle/>
+          <a:p>
+            <a:r>
+              <a:rPr lang="en-US" sz="1600" dirty="0">
+                <a:solidFill>
+                  <a:schemeClr val="bg1"/>
+                </a:solidFill>
+                <a:effectLst/>
+                <a:latin typeface="Times New Roman" panose="02020603050405020304" pitchFamily="18" charset="0"/>
+                <a:ea typeface="Times New Roman" panose="02020603050405020304" pitchFamily="18" charset="0"/>
+              </a:rPr>
+              <a:t>Note: Response time increases as concurrency increases </a:t>
+            </a:r>
+            <a:endParaRPr lang="en-US" sz="1600" dirty="0">
+              <a:solidFill>
+                <a:schemeClr val="bg1"/>
+              </a:solidFill>
+            </a:endParaRPr>
+          </a:p>
+        </p:txBody>
+      </p:sp>
     </p:spTree>
     <p:extLst>
       <p:ext uri="{BB962C8B-B14F-4D97-AF65-F5344CB8AC3E}">
@@ -20449,13 +20684,13 @@
   <p:clrMapOvr>
     <a:masterClrMapping/>
   </p:clrMapOvr>
-  <mc:AlternateContent xmlns:mc="http://schemas.openxmlformats.org/markup-compatibility/2006">
-    <mc:Choice xmlns:p14="http://schemas.microsoft.com/office/powerpoint/2010/main" Requires="p14">
+  <mc:AlternateContent xmlns:mc="http://schemas.openxmlformats.org/markup-compatibility/2006" xmlns:p14="http://schemas.microsoft.com/office/powerpoint/2010/main">
+    <mc:Choice Requires="p14">
       <p:transition p14:dur="10">
         <p:fade/>
       </p:transition>
     </mc:Choice>
-    <mc:Fallback>
+    <mc:Fallback xmlns="">
       <p:transition>
         <p:fade/>
       </p:transition>
@@ -20895,48 +21130,6 @@
                 <a:latin typeface="Times New Roman" panose="02020603050405020304" pitchFamily="18" charset="0"/>
                 <a:cs typeface="Times New Roman" panose="02020603050405020304" pitchFamily="18" charset="0"/>
               </a:rPr>
-              <a:t>The system should be able to </a:t>
-            </a:r>
-            <a:r>
-              <a:rPr lang="en-US" sz="2800" dirty="0">
-                <a:solidFill>
-                  <a:srgbClr val="FF0000"/>
-                </a:solidFill>
-                <a:effectLst/>
-                <a:latin typeface="Times New Roman" panose="02020603050405020304" pitchFamily="18" charset="0"/>
-                <a:cs typeface="Times New Roman" panose="02020603050405020304" pitchFamily="18" charset="0"/>
-              </a:rPr>
-              <a:t>restore</a:t>
-            </a:r>
-            <a:r>
-              <a:rPr lang="en-US" sz="2800" dirty="0">
-                <a:effectLst/>
-                <a:latin typeface="Times New Roman" panose="02020603050405020304" pitchFamily="18" charset="0"/>
-                <a:cs typeface="Times New Roman" panose="02020603050405020304" pitchFamily="18" charset="0"/>
-              </a:rPr>
-              <a:t> backward data of 24 hours (maximum 1 month) within 2 hours as a recovery function.</a:t>
-            </a:r>
-          </a:p>
-          <a:p>
-            <a:pPr marL="457200" marR="0" indent="-457200" algn="just">
-              <a:lnSpc>
-                <a:spcPct val="150000"/>
-              </a:lnSpc>
-              <a:spcBef>
-                <a:spcPts val="0"/>
-              </a:spcBef>
-              <a:spcAft>
-                <a:spcPts val="0"/>
-              </a:spcAft>
-              <a:buFont typeface="Wingdings" panose="05000000000000000000" pitchFamily="2" charset="2"/>
-              <a:buChar char="Ø"/>
-            </a:pPr>
-            <a:r>
-              <a:rPr lang="en-US" sz="2800" dirty="0">
-                <a:effectLst/>
-                <a:latin typeface="Times New Roman" panose="02020603050405020304" pitchFamily="18" charset="0"/>
-                <a:cs typeface="Times New Roman" panose="02020603050405020304" pitchFamily="18" charset="0"/>
-              </a:rPr>
               <a:t>All the transaction data between client and server must be </a:t>
             </a:r>
             <a:r>
@@ -20996,6 +21189,56 @@
             </a:r>
           </a:p>
           <a:p>
+            <a:pPr marL="457200" indent="-457200" algn="just">
+              <a:lnSpc>
+                <a:spcPct val="150000"/>
+              </a:lnSpc>
+              <a:buFont typeface="Wingdings" panose="05000000000000000000" pitchFamily="2" charset="2"/>
+              <a:buChar char="Ø"/>
+            </a:pPr>
+            <a:r>
+              <a:rPr lang="en-US" sz="2800" dirty="0">
+                <a:effectLst/>
+                <a:latin typeface="Times New Roman" panose="02020603050405020304" pitchFamily="18" charset="0"/>
+                <a:cs typeface="Times New Roman" panose="02020603050405020304" pitchFamily="18" charset="0"/>
+              </a:rPr>
+              <a:t>The system should be able to </a:t>
+            </a:r>
+            <a:r>
+              <a:rPr lang="en-US" sz="2800" dirty="0">
+                <a:solidFill>
+                  <a:srgbClr val="FF0000"/>
+                </a:solidFill>
+                <a:effectLst/>
+                <a:latin typeface="Times New Roman" panose="02020603050405020304" pitchFamily="18" charset="0"/>
+                <a:cs typeface="Times New Roman" panose="02020603050405020304" pitchFamily="18" charset="0"/>
+              </a:rPr>
+              <a:t>restore</a:t>
+            </a:r>
+            <a:r>
+              <a:rPr lang="en-US" sz="2800" dirty="0">
+                <a:effectLst/>
+                <a:latin typeface="Times New Roman" panose="02020603050405020304" pitchFamily="18" charset="0"/>
+                <a:cs typeface="Times New Roman" panose="02020603050405020304" pitchFamily="18" charset="0"/>
+              </a:rPr>
+              <a:t> backward data of 24 hours (maximum 3 Days) within 2 hours as a recovery function.</a:t>
+            </a:r>
+          </a:p>
+          <a:p>
+            <a:pPr marL="457200" indent="-457200" algn="just">
+              <a:lnSpc>
+                <a:spcPct val="150000"/>
+              </a:lnSpc>
+              <a:buFont typeface="Wingdings" panose="05000000000000000000" pitchFamily="2" charset="2"/>
+              <a:buChar char="Ø"/>
+            </a:pPr>
+            <a:endParaRPr lang="en-US" sz="2800" dirty="0">
+              <a:effectLst/>
+              <a:latin typeface="Times New Roman" panose="02020603050405020304" pitchFamily="18" charset="0"/>
+              <a:cs typeface="Times New Roman" panose="02020603050405020304" pitchFamily="18" charset="0"/>
+            </a:endParaRPr>
+          </a:p>
+          <a:p>
             <a:pPr marL="457200" marR="0" indent="-457200" algn="just">
               <a:lnSpc>
                 <a:spcPct val="150000"/>
@@ -21027,13 +21270,13 @@
   <p:clrMapOvr>
     <a:masterClrMapping/>
   </p:clrMapOvr>
-  <mc:AlternateContent xmlns:mc="http://schemas.openxmlformats.org/markup-compatibility/2006">
-    <mc:Choice xmlns:p14="http://schemas.microsoft.com/office/powerpoint/2010/main" Requires="p14">
+  <mc:AlternateContent xmlns:mc="http://schemas.openxmlformats.org/markup-compatibility/2006" xmlns:p14="http://schemas.microsoft.com/office/powerpoint/2010/main">
+    <mc:Choice Requires="p14">
       <p:transition p14:dur="10">
         <p:fade/>
       </p:transition>
     </mc:Choice>
-    <mc:Fallback>
+    <mc:Fallback xmlns="">
       <p:transition>
         <p:fade/>
       </p:transition>
@@ -21177,7 +21420,7 @@
                 <a:latin typeface="Times New Roman" panose="02020603050405020304" pitchFamily="18" charset="0"/>
                 <a:cs typeface="Times New Roman" panose="02020603050405020304" pitchFamily="18" charset="0"/>
               </a:rPr>
-              <a:t>The web app must support any </a:t>
+              <a:t>The web app must support latest </a:t>
             </a:r>
             <a:r>
               <a:rPr lang="en-US" sz="2800" dirty="0">
@@ -21188,7 +21431,7 @@
                 <a:latin typeface="Times New Roman" panose="02020603050405020304" pitchFamily="18" charset="0"/>
                 <a:cs typeface="Times New Roman" panose="02020603050405020304" pitchFamily="18" charset="0"/>
               </a:rPr>
-              <a:t>Web browser</a:t>
+              <a:t>Web browsers</a:t>
             </a:r>
             <a:r>
               <a:rPr lang="en-US" sz="2800" dirty="0">
@@ -21215,73 +21458,33 @@
             </a:pPr>
             <a:r>
               <a:rPr lang="en-US" sz="2800" dirty="0">
-                <a:effectLst/>
                 <a:latin typeface="Times New Roman" panose="02020603050405020304" pitchFamily="18" charset="0"/>
                 <a:cs typeface="Times New Roman" panose="02020603050405020304" pitchFamily="18" charset="0"/>
               </a:rPr>
-              <a:t>The web app must support devices running on </a:t>
+              <a:t>The web app should be </a:t>
             </a:r>
             <a:r>
               <a:rPr lang="en-US" sz="2800" dirty="0">
                 <a:solidFill>
                   <a:srgbClr val="FF0000"/>
                 </a:solidFill>
-                <a:effectLst/>
                 <a:latin typeface="Times New Roman" panose="02020603050405020304" pitchFamily="18" charset="0"/>
                 <a:cs typeface="Times New Roman" panose="02020603050405020304" pitchFamily="18" charset="0"/>
               </a:rPr>
-              <a:t>iOS versions 10.0 or later</a:t>
+              <a:t>responsive</a:t>
             </a:r>
             <a:r>
               <a:rPr lang="en-US" sz="2800" dirty="0">
-                <a:effectLst/>
                 <a:latin typeface="Times New Roman" panose="02020603050405020304" pitchFamily="18" charset="0"/>
                 <a:cs typeface="Times New Roman" panose="02020603050405020304" pitchFamily="18" charset="0"/>
               </a:rPr>
               <a:t>.</a:t>
             </a:r>
-          </a:p>
-          <a:p>
-            <a:pPr marL="457200" marR="0" indent="-457200" algn="just">
-              <a:lnSpc>
-                <a:spcPct val="150000"/>
-              </a:lnSpc>
-              <a:spcBef>
-                <a:spcPts val="0"/>
-              </a:spcBef>
-              <a:spcAft>
-                <a:spcPts val="0"/>
-              </a:spcAft>
-              <a:buFont typeface="Wingdings" panose="05000000000000000000" pitchFamily="2" charset="2"/>
-              <a:buChar char="Ø"/>
-            </a:pPr>
-            <a:r>
-              <a:rPr lang="en-US" sz="2800" dirty="0">
-                <a:effectLst/>
-                <a:latin typeface="Times New Roman" panose="02020603050405020304" pitchFamily="18" charset="0"/>
-                <a:cs typeface="Times New Roman" panose="02020603050405020304" pitchFamily="18" charset="0"/>
-              </a:rPr>
-              <a:t>The web app must support devices running on </a:t>
-            </a:r>
-            <a:r>
-              <a:rPr lang="en-US" sz="2800" dirty="0">
-                <a:solidFill>
-                  <a:srgbClr val="FF0000"/>
-                </a:solidFill>
-                <a:effectLst/>
-                <a:latin typeface="Times New Roman" panose="02020603050405020304" pitchFamily="18" charset="0"/>
-                <a:cs typeface="Times New Roman" panose="02020603050405020304" pitchFamily="18" charset="0"/>
-              </a:rPr>
-              <a:t>android versions 7.0 or later</a:t>
-            </a:r>
-            <a:r>
-              <a:rPr lang="en-US" sz="2800" dirty="0">
-                <a:effectLst/>
-                <a:latin typeface="Times New Roman" panose="02020603050405020304" pitchFamily="18" charset="0"/>
-                <a:cs typeface="Times New Roman" panose="02020603050405020304" pitchFamily="18" charset="0"/>
-              </a:rPr>
-              <a:t>.</a:t>
-            </a:r>
+            <a:endParaRPr lang="en-US" sz="2800" dirty="0">
+              <a:effectLst/>
+              <a:latin typeface="Times New Roman" panose="02020603050405020304" pitchFamily="18" charset="0"/>
+              <a:cs typeface="Times New Roman" panose="02020603050405020304" pitchFamily="18" charset="0"/>
+            </a:endParaRPr>
           </a:p>
           <a:p>
             <a:pPr marL="457200" marR="0" indent="-457200" algn="just">
@@ -21357,13 +21560,13 @@
   <p:clrMapOvr>
     <a:masterClrMapping/>
   </p:clrMapOvr>
-  <mc:AlternateContent xmlns:mc="http://schemas.openxmlformats.org/markup-compatibility/2006">
-    <mc:Choice xmlns:p14="http://schemas.microsoft.com/office/powerpoint/2010/main" Requires="p14">
+  <mc:AlternateContent xmlns:mc="http://schemas.openxmlformats.org/markup-compatibility/2006" xmlns:p14="http://schemas.microsoft.com/office/powerpoint/2010/main">
+    <mc:Choice Requires="p14">
       <p:transition p14:dur="10">
         <p:fade/>
       </p:transition>
     </mc:Choice>
-    <mc:Fallback>
+    <mc:Fallback xmlns="">
       <p:transition>
         <p:fade/>
       </p:transition>
@@ -21596,13 +21799,13 @@
   <p:clrMapOvr>
     <a:masterClrMapping/>
   </p:clrMapOvr>
-  <mc:AlternateContent xmlns:mc="http://schemas.openxmlformats.org/markup-compatibility/2006">
-    <mc:Choice xmlns:p14="http://schemas.microsoft.com/office/powerpoint/2010/main" Requires="p14">
+  <mc:AlternateContent xmlns:mc="http://schemas.openxmlformats.org/markup-compatibility/2006" xmlns:p14="http://schemas.microsoft.com/office/powerpoint/2010/main">
+    <mc:Choice Requires="p14">
       <p:transition p14:dur="10">
         <p:fade/>
       </p:transition>
     </mc:Choice>
-    <mc:Fallback>
+    <mc:Fallback xmlns="">
       <p:transition>
         <p:fade/>
       </p:transition>

</xml_diff>